<commit_message>
Updated SSD with SEC website Added line feed in UI class prompts Updated word doc with everything
</commit_message>
<xml_diff>
--- a/tp_2_stockmate/doc/TP_2_2_Presentation_StockMate.pptx
+++ b/tp_2_stockmate/doc/TP_2_2_Presentation_StockMate.pptx
@@ -6436,7 +6436,7 @@
                 <a16:creationId xmlns:a16="http://schemas.microsoft.com/office/drawing/2014/main" id="{1FDFF85F-F105-40D5-9793-90419158C3BD}"/>
               </a:ext>
               <a:ext uri="{C183D7F6-B498-43B3-948B-1728B52AA6E4}">
-                <adec:decorative xmlns:adec="http://schemas.microsoft.com/office/drawing/2017/decorative" val="1"/>
+                <adec:decorative xmlns:adec="http://schemas.microsoft.com/office/drawing/2017/decorative" xmlns="" val="1"/>
               </a:ext>
             </a:extLst>
           </p:cNvPr>
@@ -6528,7 +6528,7 @@
                 <a16:creationId xmlns:a16="http://schemas.microsoft.com/office/drawing/2014/main" id="{35AB47A4-BA8C-4250-88BD-D49C68C5F9E9}"/>
               </a:ext>
               <a:ext uri="{C183D7F6-B498-43B3-948B-1728B52AA6E4}">
-                <adec:decorative xmlns:adec="http://schemas.microsoft.com/office/drawing/2017/decorative" val="1"/>
+                <adec:decorative xmlns:adec="http://schemas.microsoft.com/office/drawing/2017/decorative" xmlns="" val="1"/>
               </a:ext>
             </a:extLst>
           </p:cNvPr>
@@ -6627,7 +6627,7 @@
                 <a16:creationId xmlns:a16="http://schemas.microsoft.com/office/drawing/2014/main" id="{66C8958D-EB99-414F-B735-863B67BB14D3}"/>
               </a:ext>
               <a:ext uri="{C183D7F6-B498-43B3-948B-1728B52AA6E4}">
-                <adec:decorative xmlns:adec="http://schemas.microsoft.com/office/drawing/2017/decorative" val="1"/>
+                <adec:decorative xmlns:adec="http://schemas.microsoft.com/office/drawing/2017/decorative" xmlns="" val="1"/>
               </a:ext>
             </a:extLst>
           </p:cNvPr>
@@ -6705,7 +6705,7 @@
                 <a16:creationId xmlns:a16="http://schemas.microsoft.com/office/drawing/2014/main" id="{39E5F3CB-7BDD-4E64-B274-CD900F08C6F3}"/>
               </a:ext>
               <a:ext uri="{C183D7F6-B498-43B3-948B-1728B52AA6E4}">
-                <adec:decorative xmlns:adec="http://schemas.microsoft.com/office/drawing/2017/decorative" val="1"/>
+                <adec:decorative xmlns:adec="http://schemas.microsoft.com/office/drawing/2017/decorative" xmlns="" val="1"/>
               </a:ext>
             </a:extLst>
           </p:cNvPr>
@@ -6884,15 +6884,19 @@
             <a:pPr lvl="2"/>
             <a:r>
               <a:rPr lang="en-US" sz="3200" dirty="0"/>
-              <a:t>Root object that </a:t>
-            </a:r>
-            <a:r>
-              <a:rPr lang="en-US" sz="3200" dirty="0" err="1"/>
-              <a:t>coorindates</a:t>
+              <a:t>Root object </a:t>
+            </a:r>
+            <a:r>
+              <a:rPr lang="en-US" sz="3200"/>
+              <a:t>that </a:t>
+            </a:r>
+            <a:r>
+              <a:rPr lang="en-US" sz="3200" smtClean="0"/>
+              <a:t>coordinates </a:t>
             </a:r>
             <a:r>
               <a:rPr lang="en-US" sz="3200" dirty="0"/>
-              <a:t> system operation</a:t>
+              <a:t>system operation</a:t>
             </a:r>
           </a:p>
           <a:p>
@@ -6968,6 +6972,10 @@
             <a:br>
               <a:rPr lang="en-US" sz="5400" dirty="0"/>
             </a:br>
+            <a:r>
+              <a:rPr lang="en-US" sz="5400" dirty="0"/>
+              <a:t/>
+            </a:r>
             <a:br>
               <a:rPr lang="en-US" sz="5400" dirty="0"/>
             </a:br>

</xml_diff>